<commit_message>
Revisão do capítulo 1 e exercício do capítulo 4.
</commit_message>
<xml_diff>
--- a/2-Java-Programmer-Modulo-II/02.Capitulo01.pptx
+++ b/2-Java-Programmer-Modulo-II/02.Capitulo01.pptx
@@ -258,7 +258,7 @@
               <a:pPr>
                 <a:defRPr/>
               </a:pPr>
-              <a:t>05/05/2012</a:t>
+              <a:t>07/05/2012</a:t>
             </a:fld>
             <a:endParaRPr lang="pt-BR"/>
           </a:p>
@@ -446,7 +446,7 @@
               <a:pPr>
                 <a:defRPr/>
               </a:pPr>
-              <a:t>‹nº›</a:t>
+              <a:t>‹#›</a:t>
             </a:fld>
             <a:endParaRPr lang="pt-BR"/>
           </a:p>
@@ -2237,7 +2237,7 @@
               <a:pPr>
                 <a:defRPr/>
               </a:pPr>
-              <a:t>05/05/2012</a:t>
+              <a:t>07/05/2012</a:t>
             </a:fld>
             <a:endParaRPr lang="pt-BR"/>
           </a:p>
@@ -2296,7 +2296,7 @@
               <a:pPr>
                 <a:defRPr/>
               </a:pPr>
-              <a:t>‹nº›</a:t>
+              <a:t>‹#›</a:t>
             </a:fld>
             <a:endParaRPr lang="pt-BR" dirty="0"/>
           </a:p>
@@ -2429,7 +2429,7 @@
               <a:pPr>
                 <a:defRPr/>
               </a:pPr>
-              <a:t>05/05/2012</a:t>
+              <a:t>07/05/2012</a:t>
             </a:fld>
             <a:endParaRPr lang="pt-BR"/>
           </a:p>
@@ -2488,7 +2488,7 @@
               <a:pPr>
                 <a:defRPr/>
               </a:pPr>
-              <a:t>‹nº›</a:t>
+              <a:t>‹#›</a:t>
             </a:fld>
             <a:endParaRPr lang="pt-BR"/>
           </a:p>
@@ -2631,7 +2631,7 @@
               <a:pPr>
                 <a:defRPr/>
               </a:pPr>
-              <a:t>05/05/2012</a:t>
+              <a:t>07/05/2012</a:t>
             </a:fld>
             <a:endParaRPr lang="pt-BR"/>
           </a:p>
@@ -2690,7 +2690,7 @@
               <a:pPr>
                 <a:defRPr/>
               </a:pPr>
-              <a:t>‹nº›</a:t>
+              <a:t>‹#›</a:t>
             </a:fld>
             <a:endParaRPr lang="pt-BR"/>
           </a:p>
@@ -2827,7 +2827,7 @@
               <a:pPr>
                 <a:defRPr/>
               </a:pPr>
-              <a:t>05/05/2012</a:t>
+              <a:t>07/05/2012</a:t>
             </a:fld>
             <a:endParaRPr lang="pt-BR"/>
           </a:p>
@@ -2886,7 +2886,7 @@
               <a:pPr>
                 <a:defRPr/>
               </a:pPr>
-              <a:t>‹nº›</a:t>
+              <a:t>‹#›</a:t>
             </a:fld>
             <a:endParaRPr lang="pt-BR" dirty="0"/>
           </a:p>
@@ -3333,7 +3333,7 @@
               <a:pPr>
                 <a:defRPr/>
               </a:pPr>
-              <a:t>05/05/2012</a:t>
+              <a:t>07/05/2012</a:t>
             </a:fld>
             <a:endParaRPr lang="pt-BR"/>
           </a:p>
@@ -3392,7 +3392,7 @@
               <a:pPr>
                 <a:defRPr/>
               </a:pPr>
-              <a:t>‹nº›</a:t>
+              <a:t>‹#›</a:t>
             </a:fld>
             <a:endParaRPr lang="pt-BR"/>
           </a:p>
@@ -3624,7 +3624,7 @@
               <a:pPr>
                 <a:defRPr/>
               </a:pPr>
-              <a:t>05/05/2012</a:t>
+              <a:t>07/05/2012</a:t>
             </a:fld>
             <a:endParaRPr lang="pt-BR"/>
           </a:p>
@@ -3683,7 +3683,7 @@
               <a:pPr>
                 <a:defRPr/>
               </a:pPr>
-              <a:t>‹nº›</a:t>
+              <a:t>‹#›</a:t>
             </a:fld>
             <a:endParaRPr lang="pt-BR"/>
           </a:p>
@@ -4025,7 +4025,7 @@
               <a:pPr>
                 <a:defRPr/>
               </a:pPr>
-              <a:t>05/05/2012</a:t>
+              <a:t>07/05/2012</a:t>
             </a:fld>
             <a:endParaRPr lang="pt-BR"/>
           </a:p>
@@ -4084,7 +4084,7 @@
               <a:pPr>
                 <a:defRPr/>
               </a:pPr>
-              <a:t>‹nº›</a:t>
+              <a:t>‹#›</a:t>
             </a:fld>
             <a:endParaRPr lang="pt-BR"/>
           </a:p>
@@ -4174,7 +4174,7 @@
               <a:pPr>
                 <a:defRPr/>
               </a:pPr>
-              <a:t>05/05/2012</a:t>
+              <a:t>07/05/2012</a:t>
             </a:fld>
             <a:endParaRPr lang="pt-BR"/>
           </a:p>
@@ -4233,7 +4233,7 @@
               <a:pPr>
                 <a:defRPr/>
               </a:pPr>
-              <a:t>‹nº›</a:t>
+              <a:t>‹#›</a:t>
             </a:fld>
             <a:endParaRPr lang="pt-BR"/>
           </a:p>
@@ -4291,7 +4291,7 @@
               <a:pPr>
                 <a:defRPr/>
               </a:pPr>
-              <a:t>05/05/2012</a:t>
+              <a:t>07/05/2012</a:t>
             </a:fld>
             <a:endParaRPr lang="pt-BR"/>
           </a:p>
@@ -4350,7 +4350,7 @@
               <a:pPr>
                 <a:defRPr/>
               </a:pPr>
-              <a:t>‹nº›</a:t>
+              <a:t>‹#›</a:t>
             </a:fld>
             <a:endParaRPr lang="pt-BR"/>
           </a:p>
@@ -4567,7 +4567,7 @@
               <a:pPr>
                 <a:defRPr/>
               </a:pPr>
-              <a:t>05/05/2012</a:t>
+              <a:t>07/05/2012</a:t>
             </a:fld>
             <a:endParaRPr lang="pt-BR"/>
           </a:p>
@@ -4631,7 +4631,7 @@
               <a:pPr>
                 <a:defRPr/>
               </a:pPr>
-              <a:t>‹nº›</a:t>
+              <a:t>‹#›</a:t>
             </a:fld>
             <a:endParaRPr lang="pt-BR"/>
           </a:p>
@@ -4851,7 +4851,7 @@
               <a:pPr>
                 <a:defRPr/>
               </a:pPr>
-              <a:t>05/05/2012</a:t>
+              <a:t>07/05/2012</a:t>
             </a:fld>
             <a:endParaRPr lang="pt-BR"/>
           </a:p>
@@ -4910,7 +4910,7 @@
               <a:pPr>
                 <a:defRPr/>
               </a:pPr>
-              <a:t>‹nº›</a:t>
+              <a:t>‹#›</a:t>
             </a:fld>
             <a:endParaRPr lang="pt-BR"/>
           </a:p>
@@ -5329,7 +5329,7 @@
               <a:pPr>
                 <a:defRPr/>
               </a:pPr>
-              <a:t>05/05/2012</a:t>
+              <a:t>07/05/2012</a:t>
             </a:fld>
             <a:endParaRPr lang="pt-BR"/>
           </a:p>
@@ -5432,7 +5432,7 @@
               <a:pPr>
                 <a:defRPr/>
               </a:pPr>
-              <a:t>‹nº›</a:t>
+              <a:t>‹#›</a:t>
             </a:fld>
             <a:endParaRPr lang="pt-BR" dirty="0"/>
           </a:p>
@@ -8490,8 +8490,13 @@
                   <a:srgbClr val="FFC000"/>
                 </a:solidFill>
               </a:rPr>
-              <a:t>1.270,00</a:t>
-            </a:r>
+              <a:t>1.270,50</a:t>
+            </a:r>
+            <a:endParaRPr lang="pt-BR" sz="2400" dirty="0" smtClean="0">
+              <a:solidFill>
+                <a:srgbClr val="FFC000"/>
+              </a:solidFill>
+            </a:endParaRPr>
           </a:p>
         </p:txBody>
       </p:sp>
@@ -8597,7 +8602,12 @@
             <p:ph idx="1"/>
           </p:nvPr>
         </p:nvSpPr>
-        <p:spPr/>
+        <p:spPr>
+          <a:xfrm>
+            <a:off x="457200" y="1600200"/>
+            <a:ext cx="7615262" cy="4525963"/>
+          </a:xfrm>
+        </p:spPr>
         <p:txBody>
           <a:bodyPr/>
           <a:lstStyle/>
@@ -8620,14 +8630,10 @@
             </a:pPr>
             <a:r>
               <a:rPr lang="pt-BR" sz="2000" dirty="0" smtClean="0"/>
-              <a:t>System.</a:t>
-            </a:r>
-            <a:r>
-              <a:rPr lang="pt-BR" sz="2000" dirty="0" err="1" smtClean="0"/>
-              <a:t>out.</a:t>
-            </a:r>
-            <a:r>
-              <a:rPr lang="pt-BR" sz="2000" dirty="0" err="1" smtClean="0">
+              <a:t>System.out.</a:t>
+            </a:r>
+            <a:r>
+              <a:rPr lang="pt-BR" sz="2000" dirty="0" smtClean="0">
                 <a:solidFill>
                   <a:srgbClr val="FFC000"/>
                 </a:solidFill>
@@ -8656,11 +8662,23 @@
                   <a:srgbClr val="FFC000"/>
                 </a:solidFill>
               </a:rPr>
-              <a:t>%-10s</a:t>
+              <a:t>%-</a:t>
+            </a:r>
+            <a:r>
+              <a:rPr lang="pt-BR" sz="2000" dirty="0" smtClean="0">
+                <a:solidFill>
+                  <a:srgbClr val="FFC000"/>
+                </a:solidFill>
+              </a:rPr>
+              <a:t>10s%n</a:t>
             </a:r>
             <a:r>
               <a:rPr lang="pt-BR" sz="2000" dirty="0" smtClean="0"/>
-              <a:t>”, “Manuel”, “Padeiro”);</a:t>
+              <a:t>”, </a:t>
+            </a:r>
+            <a:r>
+              <a:rPr lang="pt-BR" sz="2000" dirty="0" smtClean="0"/>
+              <a:t>“Manuel”, “Padeiro”);</a:t>
             </a:r>
           </a:p>
           <a:p>
@@ -8669,14 +8687,10 @@
             </a:pPr>
             <a:r>
               <a:rPr lang="pt-BR" sz="2000" dirty="0" smtClean="0"/>
-              <a:t>System.</a:t>
-            </a:r>
-            <a:r>
-              <a:rPr lang="pt-BR" sz="2000" dirty="0" err="1" smtClean="0"/>
-              <a:t>out.</a:t>
-            </a:r>
-            <a:r>
-              <a:rPr lang="pt-BR" sz="2000" dirty="0" err="1" smtClean="0">
+              <a:t>System.out.</a:t>
+            </a:r>
+            <a:r>
+              <a:rPr lang="pt-BR" sz="2000" dirty="0" smtClean="0">
                 <a:solidFill>
                   <a:srgbClr val="FFC000"/>
                 </a:solidFill>
@@ -8705,11 +8719,23 @@
                   <a:srgbClr val="FFC000"/>
                 </a:solidFill>
               </a:rPr>
-              <a:t>%-10s</a:t>
+              <a:t>%-</a:t>
+            </a:r>
+            <a:r>
+              <a:rPr lang="pt-BR" sz="2000" dirty="0" smtClean="0">
+                <a:solidFill>
+                  <a:srgbClr val="FFC000"/>
+                </a:solidFill>
+              </a:rPr>
+              <a:t>10s%n</a:t>
             </a:r>
             <a:r>
               <a:rPr lang="pt-BR" sz="2000" dirty="0" smtClean="0"/>
-              <a:t>”, “Henrique”, “Office Boy”);</a:t>
+              <a:t>”, </a:t>
+            </a:r>
+            <a:r>
+              <a:rPr lang="pt-BR" sz="2000" dirty="0" smtClean="0"/>
+              <a:t>“Henrique”, “Office Boy”);</a:t>
             </a:r>
           </a:p>
           <a:p>
@@ -8718,14 +8744,10 @@
             </a:pPr>
             <a:r>
               <a:rPr lang="pt-BR" sz="2000" dirty="0" smtClean="0"/>
-              <a:t>System.</a:t>
-            </a:r>
-            <a:r>
-              <a:rPr lang="pt-BR" sz="2000" dirty="0" err="1" smtClean="0"/>
-              <a:t>out.</a:t>
-            </a:r>
-            <a:r>
-              <a:rPr lang="pt-BR" sz="2000" dirty="0" err="1" smtClean="0">
+              <a:t>System.out.</a:t>
+            </a:r>
+            <a:r>
+              <a:rPr lang="pt-BR" sz="2000" dirty="0" smtClean="0">
                 <a:solidFill>
                   <a:srgbClr val="FFC000"/>
                 </a:solidFill>
@@ -8754,11 +8776,23 @@
                   <a:srgbClr val="FFC000"/>
                 </a:solidFill>
               </a:rPr>
-              <a:t>%-10s</a:t>
+              <a:t>%-</a:t>
+            </a:r>
+            <a:r>
+              <a:rPr lang="pt-BR" sz="2000" dirty="0" smtClean="0">
+                <a:solidFill>
+                  <a:srgbClr val="FFC000"/>
+                </a:solidFill>
+              </a:rPr>
+              <a:t>10s%n</a:t>
             </a:r>
             <a:r>
               <a:rPr lang="pt-BR" sz="2000" dirty="0" smtClean="0"/>
-              <a:t>”, “Maria”, “Caixa”);</a:t>
+              <a:t>”, </a:t>
+            </a:r>
+            <a:r>
+              <a:rPr lang="pt-BR" sz="2000" dirty="0" smtClean="0"/>
+              <a:t>“Maria”, “Caixa”);</a:t>
             </a:r>
           </a:p>
           <a:p>

</xml_diff>

<commit_message>
Ajustes de espaçamento de títulos.
</commit_message>
<xml_diff>
--- a/2-Java-Programmer-Modulo-II/02.Capitulo01.pptx
+++ b/2-Java-Programmer-Modulo-II/02.Capitulo01.pptx
@@ -258,7 +258,7 @@
               <a:pPr>
                 <a:defRPr/>
               </a:pPr>
-              <a:t>07/05/2012</a:t>
+              <a:t>05/05/2012</a:t>
             </a:fld>
             <a:endParaRPr lang="pt-BR"/>
           </a:p>
@@ -446,7 +446,7 @@
               <a:pPr>
                 <a:defRPr/>
               </a:pPr>
-              <a:t>‹#›</a:t>
+              <a:t>‹nº›</a:t>
             </a:fld>
             <a:endParaRPr lang="pt-BR"/>
           </a:p>
@@ -2237,7 +2237,7 @@
               <a:pPr>
                 <a:defRPr/>
               </a:pPr>
-              <a:t>07/05/2012</a:t>
+              <a:t>05/05/2012</a:t>
             </a:fld>
             <a:endParaRPr lang="pt-BR"/>
           </a:p>
@@ -2296,7 +2296,7 @@
               <a:pPr>
                 <a:defRPr/>
               </a:pPr>
-              <a:t>‹#›</a:t>
+              <a:t>‹nº›</a:t>
             </a:fld>
             <a:endParaRPr lang="pt-BR" dirty="0"/>
           </a:p>
@@ -2429,7 +2429,7 @@
               <a:pPr>
                 <a:defRPr/>
               </a:pPr>
-              <a:t>07/05/2012</a:t>
+              <a:t>05/05/2012</a:t>
             </a:fld>
             <a:endParaRPr lang="pt-BR"/>
           </a:p>
@@ -2488,7 +2488,7 @@
               <a:pPr>
                 <a:defRPr/>
               </a:pPr>
-              <a:t>‹#›</a:t>
+              <a:t>‹nº›</a:t>
             </a:fld>
             <a:endParaRPr lang="pt-BR"/>
           </a:p>
@@ -2631,7 +2631,7 @@
               <a:pPr>
                 <a:defRPr/>
               </a:pPr>
-              <a:t>07/05/2012</a:t>
+              <a:t>05/05/2012</a:t>
             </a:fld>
             <a:endParaRPr lang="pt-BR"/>
           </a:p>
@@ -2690,7 +2690,7 @@
               <a:pPr>
                 <a:defRPr/>
               </a:pPr>
-              <a:t>‹#›</a:t>
+              <a:t>‹nº›</a:t>
             </a:fld>
             <a:endParaRPr lang="pt-BR"/>
           </a:p>
@@ -2827,7 +2827,7 @@
               <a:pPr>
                 <a:defRPr/>
               </a:pPr>
-              <a:t>07/05/2012</a:t>
+              <a:t>05/05/2012</a:t>
             </a:fld>
             <a:endParaRPr lang="pt-BR"/>
           </a:p>
@@ -2886,7 +2886,7 @@
               <a:pPr>
                 <a:defRPr/>
               </a:pPr>
-              <a:t>‹#›</a:t>
+              <a:t>‹nº›</a:t>
             </a:fld>
             <a:endParaRPr lang="pt-BR" dirty="0"/>
           </a:p>
@@ -3333,7 +3333,7 @@
               <a:pPr>
                 <a:defRPr/>
               </a:pPr>
-              <a:t>07/05/2012</a:t>
+              <a:t>05/05/2012</a:t>
             </a:fld>
             <a:endParaRPr lang="pt-BR"/>
           </a:p>
@@ -3392,7 +3392,7 @@
               <a:pPr>
                 <a:defRPr/>
               </a:pPr>
-              <a:t>‹#›</a:t>
+              <a:t>‹nº›</a:t>
             </a:fld>
             <a:endParaRPr lang="pt-BR"/>
           </a:p>
@@ -3624,7 +3624,7 @@
               <a:pPr>
                 <a:defRPr/>
               </a:pPr>
-              <a:t>07/05/2012</a:t>
+              <a:t>05/05/2012</a:t>
             </a:fld>
             <a:endParaRPr lang="pt-BR"/>
           </a:p>
@@ -3683,7 +3683,7 @@
               <a:pPr>
                 <a:defRPr/>
               </a:pPr>
-              <a:t>‹#›</a:t>
+              <a:t>‹nº›</a:t>
             </a:fld>
             <a:endParaRPr lang="pt-BR"/>
           </a:p>
@@ -4025,7 +4025,7 @@
               <a:pPr>
                 <a:defRPr/>
               </a:pPr>
-              <a:t>07/05/2012</a:t>
+              <a:t>05/05/2012</a:t>
             </a:fld>
             <a:endParaRPr lang="pt-BR"/>
           </a:p>
@@ -4084,7 +4084,7 @@
               <a:pPr>
                 <a:defRPr/>
               </a:pPr>
-              <a:t>‹#›</a:t>
+              <a:t>‹nº›</a:t>
             </a:fld>
             <a:endParaRPr lang="pt-BR"/>
           </a:p>
@@ -4174,7 +4174,7 @@
               <a:pPr>
                 <a:defRPr/>
               </a:pPr>
-              <a:t>07/05/2012</a:t>
+              <a:t>05/05/2012</a:t>
             </a:fld>
             <a:endParaRPr lang="pt-BR"/>
           </a:p>
@@ -4233,7 +4233,7 @@
               <a:pPr>
                 <a:defRPr/>
               </a:pPr>
-              <a:t>‹#›</a:t>
+              <a:t>‹nº›</a:t>
             </a:fld>
             <a:endParaRPr lang="pt-BR"/>
           </a:p>
@@ -4291,7 +4291,7 @@
               <a:pPr>
                 <a:defRPr/>
               </a:pPr>
-              <a:t>07/05/2012</a:t>
+              <a:t>05/05/2012</a:t>
             </a:fld>
             <a:endParaRPr lang="pt-BR"/>
           </a:p>
@@ -4350,7 +4350,7 @@
               <a:pPr>
                 <a:defRPr/>
               </a:pPr>
-              <a:t>‹#›</a:t>
+              <a:t>‹nº›</a:t>
             </a:fld>
             <a:endParaRPr lang="pt-BR"/>
           </a:p>
@@ -4567,7 +4567,7 @@
               <a:pPr>
                 <a:defRPr/>
               </a:pPr>
-              <a:t>07/05/2012</a:t>
+              <a:t>05/05/2012</a:t>
             </a:fld>
             <a:endParaRPr lang="pt-BR"/>
           </a:p>
@@ -4631,7 +4631,7 @@
               <a:pPr>
                 <a:defRPr/>
               </a:pPr>
-              <a:t>‹#›</a:t>
+              <a:t>‹nº›</a:t>
             </a:fld>
             <a:endParaRPr lang="pt-BR"/>
           </a:p>
@@ -4851,7 +4851,7 @@
               <a:pPr>
                 <a:defRPr/>
               </a:pPr>
-              <a:t>07/05/2012</a:t>
+              <a:t>05/05/2012</a:t>
             </a:fld>
             <a:endParaRPr lang="pt-BR"/>
           </a:p>
@@ -4910,7 +4910,7 @@
               <a:pPr>
                 <a:defRPr/>
               </a:pPr>
-              <a:t>‹#›</a:t>
+              <a:t>‹nº›</a:t>
             </a:fld>
             <a:endParaRPr lang="pt-BR"/>
           </a:p>
@@ -5329,7 +5329,7 @@
               <a:pPr>
                 <a:defRPr/>
               </a:pPr>
-              <a:t>07/05/2012</a:t>
+              <a:t>05/05/2012</a:t>
             </a:fld>
             <a:endParaRPr lang="pt-BR"/>
           </a:p>
@@ -5432,7 +5432,7 @@
               <a:pPr>
                 <a:defRPr/>
               </a:pPr>
-              <a:t>‹#›</a:t>
+              <a:t>‹nº›</a:t>
             </a:fld>
             <a:endParaRPr lang="pt-BR" dirty="0"/>
           </a:p>
@@ -8490,13 +8490,8 @@
                   <a:srgbClr val="FFC000"/>
                 </a:solidFill>
               </a:rPr>
-              <a:t>1.270,50</a:t>
-            </a:r>
-            <a:endParaRPr lang="pt-BR" sz="2400" dirty="0" smtClean="0">
-              <a:solidFill>
-                <a:srgbClr val="FFC000"/>
-              </a:solidFill>
-            </a:endParaRPr>
+              <a:t>1.270,00</a:t>
+            </a:r>
           </a:p>
         </p:txBody>
       </p:sp>
@@ -8602,12 +8597,7 @@
             <p:ph idx="1"/>
           </p:nvPr>
         </p:nvSpPr>
-        <p:spPr>
-          <a:xfrm>
-            <a:off x="457200" y="1600200"/>
-            <a:ext cx="7615262" cy="4525963"/>
-          </a:xfrm>
-        </p:spPr>
+        <p:spPr/>
         <p:txBody>
           <a:bodyPr/>
           <a:lstStyle/>
@@ -8630,10 +8620,14 @@
             </a:pPr>
             <a:r>
               <a:rPr lang="pt-BR" sz="2000" dirty="0" smtClean="0"/>
-              <a:t>System.out.</a:t>
-            </a:r>
-            <a:r>
-              <a:rPr lang="pt-BR" sz="2000" dirty="0" smtClean="0">
+              <a:t>System.</a:t>
+            </a:r>
+            <a:r>
+              <a:rPr lang="pt-BR" sz="2000" dirty="0" err="1" smtClean="0"/>
+              <a:t>out.</a:t>
+            </a:r>
+            <a:r>
+              <a:rPr lang="pt-BR" sz="2000" dirty="0" err="1" smtClean="0">
                 <a:solidFill>
                   <a:srgbClr val="FFC000"/>
                 </a:solidFill>
@@ -8662,23 +8656,11 @@
                   <a:srgbClr val="FFC000"/>
                 </a:solidFill>
               </a:rPr>
-              <a:t>%-</a:t>
-            </a:r>
-            <a:r>
-              <a:rPr lang="pt-BR" sz="2000" dirty="0" smtClean="0">
-                <a:solidFill>
-                  <a:srgbClr val="FFC000"/>
-                </a:solidFill>
-              </a:rPr>
-              <a:t>10s%n</a:t>
+              <a:t>%-10s</a:t>
             </a:r>
             <a:r>
               <a:rPr lang="pt-BR" sz="2000" dirty="0" smtClean="0"/>
-              <a:t>”, </a:t>
-            </a:r>
-            <a:r>
-              <a:rPr lang="pt-BR" sz="2000" dirty="0" smtClean="0"/>
-              <a:t>“Manuel”, “Padeiro”);</a:t>
+              <a:t>”, “Manuel”, “Padeiro”);</a:t>
             </a:r>
           </a:p>
           <a:p>
@@ -8687,10 +8669,14 @@
             </a:pPr>
             <a:r>
               <a:rPr lang="pt-BR" sz="2000" dirty="0" smtClean="0"/>
-              <a:t>System.out.</a:t>
-            </a:r>
-            <a:r>
-              <a:rPr lang="pt-BR" sz="2000" dirty="0" smtClean="0">
+              <a:t>System.</a:t>
+            </a:r>
+            <a:r>
+              <a:rPr lang="pt-BR" sz="2000" dirty="0" err="1" smtClean="0"/>
+              <a:t>out.</a:t>
+            </a:r>
+            <a:r>
+              <a:rPr lang="pt-BR" sz="2000" dirty="0" err="1" smtClean="0">
                 <a:solidFill>
                   <a:srgbClr val="FFC000"/>
                 </a:solidFill>
@@ -8719,23 +8705,11 @@
                   <a:srgbClr val="FFC000"/>
                 </a:solidFill>
               </a:rPr>
-              <a:t>%-</a:t>
-            </a:r>
-            <a:r>
-              <a:rPr lang="pt-BR" sz="2000" dirty="0" smtClean="0">
-                <a:solidFill>
-                  <a:srgbClr val="FFC000"/>
-                </a:solidFill>
-              </a:rPr>
-              <a:t>10s%n</a:t>
+              <a:t>%-10s</a:t>
             </a:r>
             <a:r>
               <a:rPr lang="pt-BR" sz="2000" dirty="0" smtClean="0"/>
-              <a:t>”, </a:t>
-            </a:r>
-            <a:r>
-              <a:rPr lang="pt-BR" sz="2000" dirty="0" smtClean="0"/>
-              <a:t>“Henrique”, “Office Boy”);</a:t>
+              <a:t>”, “Henrique”, “Office Boy”);</a:t>
             </a:r>
           </a:p>
           <a:p>
@@ -8744,10 +8718,14 @@
             </a:pPr>
             <a:r>
               <a:rPr lang="pt-BR" sz="2000" dirty="0" smtClean="0"/>
-              <a:t>System.out.</a:t>
-            </a:r>
-            <a:r>
-              <a:rPr lang="pt-BR" sz="2000" dirty="0" smtClean="0">
+              <a:t>System.</a:t>
+            </a:r>
+            <a:r>
+              <a:rPr lang="pt-BR" sz="2000" dirty="0" err="1" smtClean="0"/>
+              <a:t>out.</a:t>
+            </a:r>
+            <a:r>
+              <a:rPr lang="pt-BR" sz="2000" dirty="0" err="1" smtClean="0">
                 <a:solidFill>
                   <a:srgbClr val="FFC000"/>
                 </a:solidFill>
@@ -8776,23 +8754,11 @@
                   <a:srgbClr val="FFC000"/>
                 </a:solidFill>
               </a:rPr>
-              <a:t>%-</a:t>
-            </a:r>
-            <a:r>
-              <a:rPr lang="pt-BR" sz="2000" dirty="0" smtClean="0">
-                <a:solidFill>
-                  <a:srgbClr val="FFC000"/>
-                </a:solidFill>
-              </a:rPr>
-              <a:t>10s%n</a:t>
+              <a:t>%-10s</a:t>
             </a:r>
             <a:r>
               <a:rPr lang="pt-BR" sz="2000" dirty="0" smtClean="0"/>
-              <a:t>”, </a:t>
-            </a:r>
-            <a:r>
-              <a:rPr lang="pt-BR" sz="2000" dirty="0" smtClean="0"/>
-              <a:t>“Maria”, “Caixa”);</a:t>
+              <a:t>”, “Maria”, “Caixa”);</a:t>
             </a:r>
           </a:p>
           <a:p>

</xml_diff>